<commit_message>
update deep into Intel CPU Inference
</commit_message>
<xml_diff>
--- a/周记/Intel CPU Inference.pptx
+++ b/周记/Intel CPU Inference.pptx
@@ -220,7 +220,7 @@
           <a:p>
             <a:fld id="{1E5BCEC9-DDE4-4B30-87D6-0017517D5E27}" type="datetimeFigureOut">
               <a:rPr lang="zh-CN" altLang="en-US" smtClean="0"/>
-              <a:t>2024/3/30</a:t>
+              <a:t>2024/4/13</a:t>
             </a:fld>
             <a:endParaRPr lang="zh-CN" altLang="en-US"/>
           </a:p>
@@ -537,7 +537,7 @@
               </a14:hiddenFill>
             </a:ext>
             <a:ext uri="{FAA26D3D-D897-4be2-8F04-BA451C77F1D7}">
-              <ma14:placeholderFlag xmlns:ma14="http://schemas.microsoft.com/office/mac/drawingml/2011/main" xmlns="" val="1"/>
+              <ma14:placeholderFlag xmlns="" xmlns:ma14="http://schemas.microsoft.com/office/mac/drawingml/2011/main" val="1"/>
             </a:ext>
           </a:extLst>
         </p:spPr>
@@ -988,7 +988,7 @@
                 <a:tabLst/>
                 <a:defRPr/>
               </a:pPr>
-              <a:t>2024/3/30</a:t>
+              <a:t>2024/4/13</a:t>
             </a:fld>
             <a:endParaRPr kumimoji="0" lang="zh-CN" altLang="en-US" sz="1200" b="1" i="0" u="none" strike="noStrike" kern="1200" cap="none" spc="0" normalizeH="0" baseline="0" noProof="0">
               <a:ln>
@@ -1304,7 +1304,7 @@
                 <a:tabLst/>
                 <a:defRPr/>
               </a:pPr>
-              <a:t>2024/3/30</a:t>
+              <a:t>2024/4/13</a:t>
             </a:fld>
             <a:endParaRPr kumimoji="0" lang="zh-CN" altLang="en-US" sz="1200" b="1" i="0" u="none" strike="noStrike" kern="1200" cap="none" spc="0" normalizeH="0" baseline="0" noProof="0">
               <a:ln>
@@ -1763,7 +1763,7 @@
                 <a:tabLst/>
                 <a:defRPr/>
               </a:pPr>
-              <a:t>2024/3/30</a:t>
+              <a:t>2024/4/13</a:t>
             </a:fld>
             <a:endParaRPr kumimoji="0" lang="zh-CN" altLang="en-US" sz="1200" b="1" i="0" u="none" strike="noStrike" kern="1200" cap="none" spc="0" normalizeH="0" baseline="0" noProof="0">
               <a:ln>
@@ -2223,7 +2223,7 @@
                 <a:tabLst/>
                 <a:defRPr/>
               </a:pPr>
-              <a:t>2024/3/30</a:t>
+              <a:t>2024/4/13</a:t>
             </a:fld>
             <a:endParaRPr kumimoji="0" lang="zh-CN" altLang="en-US" sz="1200" b="1" i="0" u="none" strike="noStrike" kern="1200" cap="none" spc="0" normalizeH="0" baseline="0" noProof="0">
               <a:ln>
@@ -2523,7 +2523,7 @@
                 <a:tabLst/>
                 <a:defRPr/>
               </a:pPr>
-              <a:t>2024/3/30</a:t>
+              <a:t>2024/4/13</a:t>
             </a:fld>
             <a:endParaRPr kumimoji="0" lang="zh-CN" altLang="en-US" sz="1200" b="1" i="0" u="none" strike="noStrike" kern="1200" cap="none" spc="0" normalizeH="0" baseline="0" noProof="0">
               <a:ln>
@@ -2810,7 +2810,7 @@
           <a:p>
             <a:fld id="{7FA7C40F-0D87-4C47-A7B0-B93EF7B2BEDD}" type="datetimeFigureOut">
               <a:rPr lang="zh-CN" altLang="en-US" smtClean="0"/>
-              <a:t>2024/3/30</a:t>
+              <a:t>2024/4/13</a:t>
             </a:fld>
             <a:endParaRPr lang="zh-CN" altLang="en-US"/>
           </a:p>
@@ -3039,7 +3039,7 @@
           <a:p>
             <a:fld id="{7FA7C40F-0D87-4C47-A7B0-B93EF7B2BEDD}" type="datetimeFigureOut">
               <a:rPr lang="zh-CN" altLang="en-US" smtClean="0"/>
-              <a:t>2024/3/30</a:t>
+              <a:t>2024/4/13</a:t>
             </a:fld>
             <a:endParaRPr lang="zh-CN" altLang="en-US"/>
           </a:p>
@@ -3301,7 +3301,7 @@
                 <a:tabLst/>
                 <a:defRPr/>
               </a:pPr>
-              <a:t>2024/3/30</a:t>
+              <a:t>2024/4/13</a:t>
             </a:fld>
             <a:endParaRPr kumimoji="0" lang="zh-CN" altLang="en-US" sz="1200" b="1" i="0" u="none" strike="noStrike" kern="1200" cap="none" spc="0" normalizeH="0" baseline="0" noProof="0">
               <a:ln>
@@ -3916,7 +3916,11 @@
           <a:p>
             <a:r>
               <a:rPr lang="en-US" altLang="zh-CN" b="1" dirty="0"/>
-              <a:t>Intel CPU inference</a:t>
+              <a:t>Intel </a:t>
+            </a:r>
+            <a:r>
+              <a:rPr lang="en-US" altLang="zh-CN" b="1"/>
+              <a:t>CPU Inference</a:t>
             </a:r>
             <a:endParaRPr lang="zh-CN" altLang="en-US" b="1" dirty="0"/>
           </a:p>

</xml_diff>